<commit_message>
Implemented feedback on introduction workshop
</commit_message>
<xml_diff>
--- a/Documents/Workshop Introductory presentation.pptx
+++ b/Documents/Workshop Introductory presentation.pptx
@@ -201,7 +201,7 @@
           <a:p>
             <a:fld id="{55CB7C17-828B-4E18-B9C8-DD723F58A836}" type="datetimeFigureOut">
               <a:rPr lang="nl-NL" smtClean="0"/>
-              <a:t>18-1-2024</a:t>
+              <a:t>28-1-2024</a:t>
             </a:fld>
             <a:endParaRPr lang="nl-NL"/>
           </a:p>
@@ -858,7 +858,7 @@
           <a:p>
             <a:fld id="{941D63F8-9D85-497E-9C79-BE4C9938811F}" type="datetimeFigureOut">
               <a:rPr lang="nl-NL" smtClean="0"/>
-              <a:t>18-1-2024</a:t>
+              <a:t>28-1-2024</a:t>
             </a:fld>
             <a:endParaRPr lang="nl-NL"/>
           </a:p>
@@ -1056,7 +1056,7 @@
           <a:p>
             <a:fld id="{941D63F8-9D85-497E-9C79-BE4C9938811F}" type="datetimeFigureOut">
               <a:rPr lang="nl-NL" smtClean="0"/>
-              <a:t>18-1-2024</a:t>
+              <a:t>28-1-2024</a:t>
             </a:fld>
             <a:endParaRPr lang="nl-NL"/>
           </a:p>
@@ -1264,7 +1264,7 @@
           <a:p>
             <a:fld id="{941D63F8-9D85-497E-9C79-BE4C9938811F}" type="datetimeFigureOut">
               <a:rPr lang="nl-NL" smtClean="0"/>
-              <a:t>18-1-2024</a:t>
+              <a:t>28-1-2024</a:t>
             </a:fld>
             <a:endParaRPr lang="nl-NL"/>
           </a:p>
@@ -1462,7 +1462,7 @@
           <a:p>
             <a:fld id="{941D63F8-9D85-497E-9C79-BE4C9938811F}" type="datetimeFigureOut">
               <a:rPr lang="nl-NL" smtClean="0"/>
-              <a:t>18-1-2024</a:t>
+              <a:t>28-1-2024</a:t>
             </a:fld>
             <a:endParaRPr lang="nl-NL"/>
           </a:p>
@@ -1737,7 +1737,7 @@
           <a:p>
             <a:fld id="{941D63F8-9D85-497E-9C79-BE4C9938811F}" type="datetimeFigureOut">
               <a:rPr lang="nl-NL" smtClean="0"/>
-              <a:t>18-1-2024</a:t>
+              <a:t>28-1-2024</a:t>
             </a:fld>
             <a:endParaRPr lang="nl-NL"/>
           </a:p>
@@ -2002,7 +2002,7 @@
           <a:p>
             <a:fld id="{941D63F8-9D85-497E-9C79-BE4C9938811F}" type="datetimeFigureOut">
               <a:rPr lang="nl-NL" smtClean="0"/>
-              <a:t>18-1-2024</a:t>
+              <a:t>28-1-2024</a:t>
             </a:fld>
             <a:endParaRPr lang="nl-NL"/>
           </a:p>
@@ -2414,7 +2414,7 @@
           <a:p>
             <a:fld id="{941D63F8-9D85-497E-9C79-BE4C9938811F}" type="datetimeFigureOut">
               <a:rPr lang="nl-NL" smtClean="0"/>
-              <a:t>18-1-2024</a:t>
+              <a:t>28-1-2024</a:t>
             </a:fld>
             <a:endParaRPr lang="nl-NL"/>
           </a:p>
@@ -2555,7 +2555,7 @@
           <a:p>
             <a:fld id="{941D63F8-9D85-497E-9C79-BE4C9938811F}" type="datetimeFigureOut">
               <a:rPr lang="nl-NL" smtClean="0"/>
-              <a:t>18-1-2024</a:t>
+              <a:t>28-1-2024</a:t>
             </a:fld>
             <a:endParaRPr lang="nl-NL"/>
           </a:p>
@@ -2668,7 +2668,7 @@
           <a:p>
             <a:fld id="{941D63F8-9D85-497E-9C79-BE4C9938811F}" type="datetimeFigureOut">
               <a:rPr lang="nl-NL" smtClean="0"/>
-              <a:t>18-1-2024</a:t>
+              <a:t>28-1-2024</a:t>
             </a:fld>
             <a:endParaRPr lang="nl-NL"/>
           </a:p>
@@ -2979,7 +2979,7 @@
           <a:p>
             <a:fld id="{941D63F8-9D85-497E-9C79-BE4C9938811F}" type="datetimeFigureOut">
               <a:rPr lang="nl-NL" smtClean="0"/>
-              <a:t>18-1-2024</a:t>
+              <a:t>28-1-2024</a:t>
             </a:fld>
             <a:endParaRPr lang="nl-NL"/>
           </a:p>
@@ -3267,7 +3267,7 @@
           <a:p>
             <a:fld id="{941D63F8-9D85-497E-9C79-BE4C9938811F}" type="datetimeFigureOut">
               <a:rPr lang="nl-NL" smtClean="0"/>
-              <a:t>18-1-2024</a:t>
+              <a:t>28-1-2024</a:t>
             </a:fld>
             <a:endParaRPr lang="nl-NL"/>
           </a:p>
@@ -3508,7 +3508,7 @@
           <a:p>
             <a:fld id="{941D63F8-9D85-497E-9C79-BE4C9938811F}" type="datetimeFigureOut">
               <a:rPr lang="nl-NL" smtClean="0"/>
-              <a:t>18-1-2024</a:t>
+              <a:t>28-1-2024</a:t>
             </a:fld>
             <a:endParaRPr lang="nl-NL"/>
           </a:p>
@@ -5910,11 +5910,20 @@
             </a:r>
             <a:r>
               <a:rPr lang="nl-NL" sz="2400" b="1"/>
-              <a:t>?: </a:t>
+              <a:t>? </a:t>
+            </a:r>
+          </a:p>
+          <a:p>
+            <a:pPr marL="0" indent="0">
+              <a:buNone/>
+            </a:pPr>
+            <a:r>
+              <a:rPr lang="nl-NL" sz="2400"/>
+              <a:t>ASK</a:t>
             </a:r>
             <a:r>
               <a:rPr lang="nl-NL" sz="2400" dirty="0"/>
-              <a:t>ASK! We are here </a:t>
+              <a:t>! We are here </a:t>
             </a:r>
             <a:r>
               <a:rPr lang="nl-NL" sz="2400" dirty="0" err="1"/>

</xml_diff>